<commit_message>
vector column has been indexed
</commit_message>
<xml_diff>
--- a/Collection Layout for ALS Disease Project.pptx
+++ b/Collection Layout for ALS Disease Project.pptx
@@ -5,7 +5,9 @@
     <p:sldMasterId id="2147483648" r:id="rId1"/>
   </p:sldMasterIdLst>
   <p:sldIdLst>
-    <p:sldId id="256" r:id="rId2"/>
+    <p:sldId id="257" r:id="rId2"/>
+    <p:sldId id="256" r:id="rId3"/>
+    <p:sldId id="258" r:id="rId4"/>
   </p:sldIdLst>
   <p:sldSz cx="12192000" cy="6858000"/>
   <p:notesSz cx="6858000" cy="9144000"/>
@@ -104,6 +106,11 @@
       </a:defRPr>
     </a:lvl9pPr>
   </p:defaultTextStyle>
+  <p:extLst>
+    <p:ext uri="{EFAFB233-063F-42B5-8137-9DF3F51BA10A}">
+      <p15:sldGuideLst xmlns:p15="http://schemas.microsoft.com/office/powerpoint/2012/main"/>
+    </p:ext>
+  </p:extLst>
 </p:presentation>
 </file>
 
@@ -254,7 +261,7 @@
           <a:p>
             <a:fld id="{BF48B145-F98B-4C78-AE94-87177324A4E4}" type="datetimeFigureOut">
               <a:rPr lang="en-US" smtClean="0"/>
-              <a:t>7/25/2024</a:t>
+              <a:t>7/26/2024</a:t>
             </a:fld>
             <a:endParaRPr lang="en-US"/>
           </a:p>
@@ -452,7 +459,7 @@
           <a:p>
             <a:fld id="{BF48B145-F98B-4C78-AE94-87177324A4E4}" type="datetimeFigureOut">
               <a:rPr lang="en-US" smtClean="0"/>
-              <a:t>7/25/2024</a:t>
+              <a:t>7/26/2024</a:t>
             </a:fld>
             <a:endParaRPr lang="en-US"/>
           </a:p>
@@ -660,7 +667,7 @@
           <a:p>
             <a:fld id="{BF48B145-F98B-4C78-AE94-87177324A4E4}" type="datetimeFigureOut">
               <a:rPr lang="en-US" smtClean="0"/>
-              <a:t>7/25/2024</a:t>
+              <a:t>7/26/2024</a:t>
             </a:fld>
             <a:endParaRPr lang="en-US"/>
           </a:p>
@@ -858,7 +865,7 @@
           <a:p>
             <a:fld id="{BF48B145-F98B-4C78-AE94-87177324A4E4}" type="datetimeFigureOut">
               <a:rPr lang="en-US" smtClean="0"/>
-              <a:t>7/25/2024</a:t>
+              <a:t>7/26/2024</a:t>
             </a:fld>
             <a:endParaRPr lang="en-US"/>
           </a:p>
@@ -1133,7 +1140,7 @@
           <a:p>
             <a:fld id="{BF48B145-F98B-4C78-AE94-87177324A4E4}" type="datetimeFigureOut">
               <a:rPr lang="en-US" smtClean="0"/>
-              <a:t>7/25/2024</a:t>
+              <a:t>7/26/2024</a:t>
             </a:fld>
             <a:endParaRPr lang="en-US"/>
           </a:p>
@@ -1398,7 +1405,7 @@
           <a:p>
             <a:fld id="{BF48B145-F98B-4C78-AE94-87177324A4E4}" type="datetimeFigureOut">
               <a:rPr lang="en-US" smtClean="0"/>
-              <a:t>7/25/2024</a:t>
+              <a:t>7/26/2024</a:t>
             </a:fld>
             <a:endParaRPr lang="en-US"/>
           </a:p>
@@ -1810,7 +1817,7 @@
           <a:p>
             <a:fld id="{BF48B145-F98B-4C78-AE94-87177324A4E4}" type="datetimeFigureOut">
               <a:rPr lang="en-US" smtClean="0"/>
-              <a:t>7/25/2024</a:t>
+              <a:t>7/26/2024</a:t>
             </a:fld>
             <a:endParaRPr lang="en-US"/>
           </a:p>
@@ -1951,7 +1958,7 @@
           <a:p>
             <a:fld id="{BF48B145-F98B-4C78-AE94-87177324A4E4}" type="datetimeFigureOut">
               <a:rPr lang="en-US" smtClean="0"/>
-              <a:t>7/25/2024</a:t>
+              <a:t>7/26/2024</a:t>
             </a:fld>
             <a:endParaRPr lang="en-US"/>
           </a:p>
@@ -2064,7 +2071,7 @@
           <a:p>
             <a:fld id="{BF48B145-F98B-4C78-AE94-87177324A4E4}" type="datetimeFigureOut">
               <a:rPr lang="en-US" smtClean="0"/>
-              <a:t>7/25/2024</a:t>
+              <a:t>7/26/2024</a:t>
             </a:fld>
             <a:endParaRPr lang="en-US"/>
           </a:p>
@@ -2375,7 +2382,7 @@
           <a:p>
             <a:fld id="{BF48B145-F98B-4C78-AE94-87177324A4E4}" type="datetimeFigureOut">
               <a:rPr lang="en-US" smtClean="0"/>
-              <a:t>7/25/2024</a:t>
+              <a:t>7/26/2024</a:t>
             </a:fld>
             <a:endParaRPr lang="en-US"/>
           </a:p>
@@ -2663,7 +2670,7 @@
           <a:p>
             <a:fld id="{BF48B145-F98B-4C78-AE94-87177324A4E4}" type="datetimeFigureOut">
               <a:rPr lang="en-US" smtClean="0"/>
-              <a:t>7/25/2024</a:t>
+              <a:t>7/26/2024</a:t>
             </a:fld>
             <a:endParaRPr lang="en-US"/>
           </a:p>
@@ -2904,7 +2911,7 @@
           <a:p>
             <a:fld id="{BF48B145-F98B-4C78-AE94-87177324A4E4}" type="datetimeFigureOut">
               <a:rPr lang="en-US" smtClean="0"/>
-              <a:t>7/25/2024</a:t>
+              <a:t>7/26/2024</a:t>
             </a:fld>
             <a:endParaRPr lang="en-US"/>
           </a:p>
@@ -3305,6 +3312,118 @@
 </file>
 
 <file path=ppt/slides/slide1.xml><?xml version="1.0" encoding="utf-8"?>
+<p:sld xmlns:a="http://schemas.openxmlformats.org/drawingml/2006/main" xmlns:r="http://schemas.openxmlformats.org/officeDocument/2006/relationships" xmlns:p="http://schemas.openxmlformats.org/presentationml/2006/main">
+  <p:cSld>
+    <p:spTree>
+      <p:nvGrpSpPr>
+        <p:cNvPr id="1" name=""/>
+        <p:cNvGrpSpPr/>
+        <p:nvPr/>
+      </p:nvGrpSpPr>
+      <p:grpSpPr>
+        <a:xfrm>
+          <a:off x="0" y="0"/>
+          <a:ext cx="0" cy="0"/>
+          <a:chOff x="0" y="0"/>
+          <a:chExt cx="0" cy="0"/>
+        </a:xfrm>
+      </p:grpSpPr>
+      <p:sp>
+        <p:nvSpPr>
+          <p:cNvPr id="2" name="Title 1">
+            <a:extLst>
+              <a:ext uri="{FF2B5EF4-FFF2-40B4-BE49-F238E27FC236}">
+                <a16:creationId xmlns:a16="http://schemas.microsoft.com/office/drawing/2014/main" id="{FA6C5C04-3FB1-C2C8-2498-691097F48B63}"/>
+              </a:ext>
+            </a:extLst>
+          </p:cNvPr>
+          <p:cNvSpPr>
+            <a:spLocks noGrp="1"/>
+          </p:cNvSpPr>
+          <p:nvPr>
+            <p:ph type="title"/>
+          </p:nvPr>
+        </p:nvSpPr>
+        <p:spPr/>
+        <p:txBody>
+          <a:bodyPr/>
+          <a:lstStyle/>
+          <a:p>
+            <a:endParaRPr lang="en-US"/>
+          </a:p>
+        </p:txBody>
+      </p:sp>
+      <p:pic>
+        <p:nvPicPr>
+          <p:cNvPr id="5" name="Content Placeholder 4">
+            <a:extLst>
+              <a:ext uri="{FF2B5EF4-FFF2-40B4-BE49-F238E27FC236}">
+                <a16:creationId xmlns:a16="http://schemas.microsoft.com/office/drawing/2014/main" id="{58A3304A-23C5-0DF2-F912-BC2B3FD071BE}"/>
+              </a:ext>
+            </a:extLst>
+          </p:cNvPr>
+          <p:cNvPicPr>
+            <a:picLocks noGrp="1" noChangeAspect="1"/>
+          </p:cNvPicPr>
+          <p:nvPr>
+            <p:ph idx="1"/>
+          </p:nvPr>
+        </p:nvPicPr>
+        <p:blipFill rotWithShape="1">
+          <a:blip r:embed="rId2"/>
+          <a:srcRect t="15493"/>
+          <a:stretch/>
+        </p:blipFill>
+        <p:spPr>
+          <a:xfrm>
+            <a:off x="1926656" y="2168372"/>
+            <a:ext cx="7201749" cy="2758736"/>
+          </a:xfrm>
+        </p:spPr>
+      </p:pic>
+      <p:pic>
+        <p:nvPicPr>
+          <p:cNvPr id="6" name="Content Placeholder 4">
+            <a:extLst>
+              <a:ext uri="{FF2B5EF4-FFF2-40B4-BE49-F238E27FC236}">
+                <a16:creationId xmlns:a16="http://schemas.microsoft.com/office/drawing/2014/main" id="{B3A61B7D-FCB6-47BE-2645-7D6BF822EC50}"/>
+              </a:ext>
+            </a:extLst>
+          </p:cNvPr>
+          <p:cNvPicPr>
+            <a:picLocks noChangeAspect="1"/>
+          </p:cNvPicPr>
+          <p:nvPr/>
+        </p:nvPicPr>
+        <p:blipFill rotWithShape="1">
+          <a:blip r:embed="rId2"/>
+          <a:srcRect r="16506" b="84251"/>
+          <a:stretch/>
+        </p:blipFill>
+        <p:spPr>
+          <a:xfrm>
+            <a:off x="3606017" y="5009472"/>
+            <a:ext cx="4623583" cy="395320"/>
+          </a:xfrm>
+          <a:prstGeom prst="rect">
+            <a:avLst/>
+          </a:prstGeom>
+        </p:spPr>
+      </p:pic>
+    </p:spTree>
+    <p:extLst>
+      <p:ext uri="{BB962C8B-B14F-4D97-AF65-F5344CB8AC3E}">
+        <p14:creationId xmlns:p14="http://schemas.microsoft.com/office/powerpoint/2010/main" val="224049815"/>
+      </p:ext>
+    </p:extLst>
+  </p:cSld>
+  <p:clrMapOvr>
+    <a:masterClrMapping/>
+  </p:clrMapOvr>
+</p:sld>
+</file>
+
+<file path=ppt/slides/slide2.xml><?xml version="1.0" encoding="utf-8"?>
 <p:sld xmlns:a="http://schemas.openxmlformats.org/drawingml/2006/main" xmlns:r="http://schemas.openxmlformats.org/officeDocument/2006/relationships" xmlns:p="http://schemas.openxmlformats.org/presentationml/2006/main">
   <p:cSld>
     <p:spTree>
@@ -4505,6 +4624,90 @@
 </p:sld>
 </file>
 
+<file path=ppt/slides/slide3.xml><?xml version="1.0" encoding="utf-8"?>
+<p:sld xmlns:a="http://schemas.openxmlformats.org/drawingml/2006/main" xmlns:r="http://schemas.openxmlformats.org/officeDocument/2006/relationships" xmlns:p="http://schemas.openxmlformats.org/presentationml/2006/main">
+  <p:cSld>
+    <p:spTree>
+      <p:nvGrpSpPr>
+        <p:cNvPr id="1" name=""/>
+        <p:cNvGrpSpPr/>
+        <p:nvPr/>
+      </p:nvGrpSpPr>
+      <p:grpSpPr>
+        <a:xfrm>
+          <a:off x="0" y="0"/>
+          <a:ext cx="0" cy="0"/>
+          <a:chOff x="0" y="0"/>
+          <a:chExt cx="0" cy="0"/>
+        </a:xfrm>
+      </p:grpSpPr>
+      <p:sp>
+        <p:nvSpPr>
+          <p:cNvPr id="2" name="Title 1">
+            <a:extLst>
+              <a:ext uri="{FF2B5EF4-FFF2-40B4-BE49-F238E27FC236}">
+                <a16:creationId xmlns:a16="http://schemas.microsoft.com/office/drawing/2014/main" id="{8336D26E-4529-42F7-C69B-53DB1C4A37A7}"/>
+              </a:ext>
+            </a:extLst>
+          </p:cNvPr>
+          <p:cNvSpPr>
+            <a:spLocks noGrp="1"/>
+          </p:cNvSpPr>
+          <p:nvPr>
+            <p:ph type="title"/>
+          </p:nvPr>
+        </p:nvSpPr>
+        <p:spPr/>
+        <p:txBody>
+          <a:bodyPr/>
+          <a:lstStyle/>
+          <a:p>
+            <a:endParaRPr lang="en-US"/>
+          </a:p>
+        </p:txBody>
+      </p:sp>
+      <p:pic>
+        <p:nvPicPr>
+          <p:cNvPr id="5" name="Content Placeholder 4">
+            <a:extLst>
+              <a:ext uri="{FF2B5EF4-FFF2-40B4-BE49-F238E27FC236}">
+                <a16:creationId xmlns:a16="http://schemas.microsoft.com/office/drawing/2014/main" id="{3B21A710-332D-8B70-B397-C8057AD3E424}"/>
+              </a:ext>
+            </a:extLst>
+          </p:cNvPr>
+          <p:cNvPicPr>
+            <a:picLocks noGrp="1" noChangeAspect="1"/>
+          </p:cNvPicPr>
+          <p:nvPr>
+            <p:ph idx="1"/>
+          </p:nvPr>
+        </p:nvPicPr>
+        <p:blipFill>
+          <a:blip r:embed="rId2"/>
+          <a:stretch>
+            <a:fillRect/>
+          </a:stretch>
+        </p:blipFill>
+        <p:spPr>
+          <a:xfrm>
+            <a:off x="4052429" y="1887769"/>
+            <a:ext cx="4548780" cy="4351338"/>
+          </a:xfrm>
+        </p:spPr>
+      </p:pic>
+    </p:spTree>
+    <p:extLst>
+      <p:ext uri="{BB962C8B-B14F-4D97-AF65-F5344CB8AC3E}">
+        <p14:creationId xmlns:p14="http://schemas.microsoft.com/office/powerpoint/2010/main" val="4022789647"/>
+      </p:ext>
+    </p:extLst>
+  </p:cSld>
+  <p:clrMapOvr>
+    <a:masterClrMapping/>
+  </p:clrMapOvr>
+</p:sld>
+</file>
+
 <file path=ppt/theme/theme1.xml><?xml version="1.0" encoding="utf-8"?>
 <a:theme xmlns:a="http://schemas.openxmlformats.org/drawingml/2006/main" name="Office Theme">
   <a:themeElements>

</xml_diff>